<commit_message>
getting ready to make the repo public
</commit_message>
<xml_diff>
--- a/Documentation/Presentation/Presentation.pptx
+++ b/Documentation/Presentation/Presentation.pptx
@@ -6,11 +6,17 @@
     <p:sldMasterId id="2147483661" r:id="rId2"/>
   </p:sldMasterIdLst>
   <p:notesMasterIdLst>
-    <p:notesMasterId r:id="rId5"/>
+    <p:notesMasterId r:id="rId11"/>
   </p:notesMasterIdLst>
   <p:sldIdLst>
     <p:sldId id="256" r:id="rId3"/>
     <p:sldId id="257" r:id="rId4"/>
+    <p:sldId id="258" r:id="rId5"/>
+    <p:sldId id="259" r:id="rId6"/>
+    <p:sldId id="260" r:id="rId7"/>
+    <p:sldId id="261" r:id="rId8"/>
+    <p:sldId id="262" r:id="rId9"/>
+    <p:sldId id="263" r:id="rId10"/>
   </p:sldIdLst>
   <p:sldSz cx="9144000" cy="6858000" type="screen4x3"/>
   <p:notesSz cx="6858000" cy="9144000"/>
@@ -625,8 +631,8 @@
         </p:nvSpPr>
         <p:spPr>
           <a:xfrm>
-            <a:off x="1143225" y="685800"/>
-            <a:ext cx="4572299" cy="3429000"/>
+            <a:off x="1143000" y="685800"/>
+            <a:ext cx="4572000" cy="3429000"/>
           </a:xfrm>
           <a:custGeom>
             <a:avLst/>
@@ -700,6 +706,702 @@
         </p:txBody>
       </p:sp>
     </p:spTree>
+  </p:cSld>
+  <p:clrMapOvr>
+    <a:masterClrMapping/>
+  </p:clrMapOvr>
+</p:notes>
+</file>
+
+<file path=ppt/notesSlides/notesSlide3.xml><?xml version="1.0" encoding="utf-8"?>
+<p:notes xmlns:a="http://schemas.openxmlformats.org/drawingml/2006/main" xmlns:r="http://schemas.openxmlformats.org/officeDocument/2006/relationships" xmlns:p="http://schemas.openxmlformats.org/presentationml/2006/main" showMasterSp="0" showMasterPhAnim="0">
+  <p:cSld>
+    <p:spTree>
+      <p:nvGrpSpPr>
+        <p:cNvPr id="1" name="Shape 59"/>
+        <p:cNvGrpSpPr/>
+        <p:nvPr/>
+      </p:nvGrpSpPr>
+      <p:grpSpPr>
+        <a:xfrm>
+          <a:off x="0" y="0"/>
+          <a:ext cx="0" cy="0"/>
+          <a:chOff x="0" y="0"/>
+          <a:chExt cx="0" cy="0"/>
+        </a:xfrm>
+      </p:grpSpPr>
+      <p:sp>
+        <p:nvSpPr>
+          <p:cNvPr id="60" name="Shape 60"/>
+          <p:cNvSpPr>
+            <a:spLocks noGrp="1" noRot="1" noChangeAspect="1"/>
+          </p:cNvSpPr>
+          <p:nvPr>
+            <p:ph type="sldImg" idx="2"/>
+          </p:nvPr>
+        </p:nvSpPr>
+        <p:spPr>
+          <a:xfrm>
+            <a:off x="1143000" y="685800"/>
+            <a:ext cx="4572000" cy="3429000"/>
+          </a:xfrm>
+          <a:custGeom>
+            <a:avLst/>
+            <a:gdLst/>
+            <a:ahLst/>
+            <a:cxnLst/>
+            <a:rect l="0" t="0" r="0" b="0"/>
+            <a:pathLst>
+              <a:path w="120000" h="120000" extrusionOk="0">
+                <a:moveTo>
+                  <a:pt x="0" y="0"/>
+                </a:moveTo>
+                <a:lnTo>
+                  <a:pt x="120000" y="0"/>
+                </a:lnTo>
+                <a:lnTo>
+                  <a:pt x="120000" y="120000"/>
+                </a:lnTo>
+                <a:lnTo>
+                  <a:pt x="0" y="120000"/>
+                </a:lnTo>
+                <a:close/>
+              </a:path>
+            </a:pathLst>
+          </a:custGeom>
+          <a:noFill/>
+          <a:ln w="9525" cap="flat">
+            <a:solidFill>
+              <a:srgbClr val="000000"/>
+            </a:solidFill>
+            <a:prstDash val="solid"/>
+            <a:round/>
+            <a:headEnd type="none" w="med" len="med"/>
+            <a:tailEnd type="none" w="med" len="med"/>
+          </a:ln>
+        </p:spPr>
+      </p:sp>
+      <p:sp>
+        <p:nvSpPr>
+          <p:cNvPr id="61" name="Shape 61"/>
+          <p:cNvSpPr txBox="1">
+            <a:spLocks noGrp="1"/>
+          </p:cNvSpPr>
+          <p:nvPr>
+            <p:ph type="body" idx="1"/>
+          </p:nvPr>
+        </p:nvSpPr>
+        <p:spPr>
+          <a:xfrm>
+            <a:off x="685800" y="4343400"/>
+            <a:ext cx="5486399" cy="4114800"/>
+          </a:xfrm>
+          <a:prstGeom prst="rect">
+            <a:avLst/>
+          </a:prstGeom>
+        </p:spPr>
+        <p:txBody>
+          <a:bodyPr lIns="91425" tIns="91425" rIns="91425" bIns="91425" anchor="t" anchorCtr="0">
+            <a:noAutofit/>
+          </a:bodyPr>
+          <a:lstStyle/>
+          <a:p>
+            <a:pPr lvl="0" rtl="0">
+              <a:spcBef>
+                <a:spcPts val="0"/>
+              </a:spcBef>
+              <a:buNone/>
+            </a:pPr>
+            <a:endParaRPr/>
+          </a:p>
+        </p:txBody>
+      </p:sp>
+    </p:spTree>
+    <p:extLst>
+      <p:ext uri="{BB962C8B-B14F-4D97-AF65-F5344CB8AC3E}">
+        <p14:creationId xmlns:p14="http://schemas.microsoft.com/office/powerpoint/2010/main" val="1919040112"/>
+      </p:ext>
+    </p:extLst>
+  </p:cSld>
+  <p:clrMapOvr>
+    <a:masterClrMapping/>
+  </p:clrMapOvr>
+</p:notes>
+</file>
+
+<file path=ppt/notesSlides/notesSlide4.xml><?xml version="1.0" encoding="utf-8"?>
+<p:notes xmlns:a="http://schemas.openxmlformats.org/drawingml/2006/main" xmlns:r="http://schemas.openxmlformats.org/officeDocument/2006/relationships" xmlns:p="http://schemas.openxmlformats.org/presentationml/2006/main" showMasterSp="0" showMasterPhAnim="0">
+  <p:cSld>
+    <p:spTree>
+      <p:nvGrpSpPr>
+        <p:cNvPr id="1" name="Shape 59"/>
+        <p:cNvGrpSpPr/>
+        <p:nvPr/>
+      </p:nvGrpSpPr>
+      <p:grpSpPr>
+        <a:xfrm>
+          <a:off x="0" y="0"/>
+          <a:ext cx="0" cy="0"/>
+          <a:chOff x="0" y="0"/>
+          <a:chExt cx="0" cy="0"/>
+        </a:xfrm>
+      </p:grpSpPr>
+      <p:sp>
+        <p:nvSpPr>
+          <p:cNvPr id="60" name="Shape 60"/>
+          <p:cNvSpPr>
+            <a:spLocks noGrp="1" noRot="1" noChangeAspect="1"/>
+          </p:cNvSpPr>
+          <p:nvPr>
+            <p:ph type="sldImg" idx="2"/>
+          </p:nvPr>
+        </p:nvSpPr>
+        <p:spPr>
+          <a:xfrm>
+            <a:off x="1143225" y="685800"/>
+            <a:ext cx="4572299" cy="3429000"/>
+          </a:xfrm>
+          <a:custGeom>
+            <a:avLst/>
+            <a:gdLst/>
+            <a:ahLst/>
+            <a:cxnLst/>
+            <a:rect l="0" t="0" r="0" b="0"/>
+            <a:pathLst>
+              <a:path w="120000" h="120000" extrusionOk="0">
+                <a:moveTo>
+                  <a:pt x="0" y="0"/>
+                </a:moveTo>
+                <a:lnTo>
+                  <a:pt x="120000" y="0"/>
+                </a:lnTo>
+                <a:lnTo>
+                  <a:pt x="120000" y="120000"/>
+                </a:lnTo>
+                <a:lnTo>
+                  <a:pt x="0" y="120000"/>
+                </a:lnTo>
+                <a:close/>
+              </a:path>
+            </a:pathLst>
+          </a:custGeom>
+          <a:noFill/>
+          <a:ln w="9525" cap="flat">
+            <a:solidFill>
+              <a:srgbClr val="000000"/>
+            </a:solidFill>
+            <a:prstDash val="solid"/>
+            <a:round/>
+            <a:headEnd type="none" w="med" len="med"/>
+            <a:tailEnd type="none" w="med" len="med"/>
+          </a:ln>
+        </p:spPr>
+      </p:sp>
+      <p:sp>
+        <p:nvSpPr>
+          <p:cNvPr id="61" name="Shape 61"/>
+          <p:cNvSpPr txBox="1">
+            <a:spLocks noGrp="1"/>
+          </p:cNvSpPr>
+          <p:nvPr>
+            <p:ph type="body" idx="1"/>
+          </p:nvPr>
+        </p:nvSpPr>
+        <p:spPr>
+          <a:xfrm>
+            <a:off x="685800" y="4343400"/>
+            <a:ext cx="5486399" cy="4114800"/>
+          </a:xfrm>
+          <a:prstGeom prst="rect">
+            <a:avLst/>
+          </a:prstGeom>
+        </p:spPr>
+        <p:txBody>
+          <a:bodyPr lIns="91425" tIns="91425" rIns="91425" bIns="91425" anchor="t" anchorCtr="0">
+            <a:noAutofit/>
+          </a:bodyPr>
+          <a:lstStyle/>
+          <a:p>
+            <a:pPr lvl="0" rtl="0">
+              <a:spcBef>
+                <a:spcPts val="0"/>
+              </a:spcBef>
+              <a:buNone/>
+            </a:pPr>
+            <a:endParaRPr/>
+          </a:p>
+        </p:txBody>
+      </p:sp>
+    </p:spTree>
+    <p:extLst>
+      <p:ext uri="{BB962C8B-B14F-4D97-AF65-F5344CB8AC3E}">
+        <p14:creationId xmlns:p14="http://schemas.microsoft.com/office/powerpoint/2010/main" val="4088218580"/>
+      </p:ext>
+    </p:extLst>
+  </p:cSld>
+  <p:clrMapOvr>
+    <a:masterClrMapping/>
+  </p:clrMapOvr>
+</p:notes>
+</file>
+
+<file path=ppt/notesSlides/notesSlide5.xml><?xml version="1.0" encoding="utf-8"?>
+<p:notes xmlns:a="http://schemas.openxmlformats.org/drawingml/2006/main" xmlns:r="http://schemas.openxmlformats.org/officeDocument/2006/relationships" xmlns:p="http://schemas.openxmlformats.org/presentationml/2006/main" showMasterSp="0" showMasterPhAnim="0">
+  <p:cSld>
+    <p:spTree>
+      <p:nvGrpSpPr>
+        <p:cNvPr id="1" name="Shape 59"/>
+        <p:cNvGrpSpPr/>
+        <p:nvPr/>
+      </p:nvGrpSpPr>
+      <p:grpSpPr>
+        <a:xfrm>
+          <a:off x="0" y="0"/>
+          <a:ext cx="0" cy="0"/>
+          <a:chOff x="0" y="0"/>
+          <a:chExt cx="0" cy="0"/>
+        </a:xfrm>
+      </p:grpSpPr>
+      <p:sp>
+        <p:nvSpPr>
+          <p:cNvPr id="60" name="Shape 60"/>
+          <p:cNvSpPr>
+            <a:spLocks noGrp="1" noRot="1" noChangeAspect="1"/>
+          </p:cNvSpPr>
+          <p:nvPr>
+            <p:ph type="sldImg" idx="2"/>
+          </p:nvPr>
+        </p:nvSpPr>
+        <p:spPr>
+          <a:xfrm>
+            <a:off x="1143000" y="685800"/>
+            <a:ext cx="4572000" cy="3429000"/>
+          </a:xfrm>
+          <a:custGeom>
+            <a:avLst/>
+            <a:gdLst/>
+            <a:ahLst/>
+            <a:cxnLst/>
+            <a:rect l="0" t="0" r="0" b="0"/>
+            <a:pathLst>
+              <a:path w="120000" h="120000" extrusionOk="0">
+                <a:moveTo>
+                  <a:pt x="0" y="0"/>
+                </a:moveTo>
+                <a:lnTo>
+                  <a:pt x="120000" y="0"/>
+                </a:lnTo>
+                <a:lnTo>
+                  <a:pt x="120000" y="120000"/>
+                </a:lnTo>
+                <a:lnTo>
+                  <a:pt x="0" y="120000"/>
+                </a:lnTo>
+                <a:close/>
+              </a:path>
+            </a:pathLst>
+          </a:custGeom>
+          <a:noFill/>
+          <a:ln w="9525" cap="flat">
+            <a:solidFill>
+              <a:srgbClr val="000000"/>
+            </a:solidFill>
+            <a:prstDash val="solid"/>
+            <a:round/>
+            <a:headEnd type="none" w="med" len="med"/>
+            <a:tailEnd type="none" w="med" len="med"/>
+          </a:ln>
+        </p:spPr>
+      </p:sp>
+      <p:sp>
+        <p:nvSpPr>
+          <p:cNvPr id="61" name="Shape 61"/>
+          <p:cNvSpPr txBox="1">
+            <a:spLocks noGrp="1"/>
+          </p:cNvSpPr>
+          <p:nvPr>
+            <p:ph type="body" idx="1"/>
+          </p:nvPr>
+        </p:nvSpPr>
+        <p:spPr>
+          <a:xfrm>
+            <a:off x="685800" y="4343400"/>
+            <a:ext cx="5486399" cy="4114800"/>
+          </a:xfrm>
+          <a:prstGeom prst="rect">
+            <a:avLst/>
+          </a:prstGeom>
+        </p:spPr>
+        <p:txBody>
+          <a:bodyPr lIns="91425" tIns="91425" rIns="91425" bIns="91425" anchor="t" anchorCtr="0">
+            <a:noAutofit/>
+          </a:bodyPr>
+          <a:lstStyle/>
+          <a:p>
+            <a:pPr lvl="0" rtl="0">
+              <a:spcBef>
+                <a:spcPts val="0"/>
+              </a:spcBef>
+              <a:buNone/>
+            </a:pPr>
+            <a:endParaRPr/>
+          </a:p>
+        </p:txBody>
+      </p:sp>
+    </p:spTree>
+    <p:extLst>
+      <p:ext uri="{BB962C8B-B14F-4D97-AF65-F5344CB8AC3E}">
+        <p14:creationId xmlns:p14="http://schemas.microsoft.com/office/powerpoint/2010/main" val="195839883"/>
+      </p:ext>
+    </p:extLst>
+  </p:cSld>
+  <p:clrMapOvr>
+    <a:masterClrMapping/>
+  </p:clrMapOvr>
+</p:notes>
+</file>
+
+<file path=ppt/notesSlides/notesSlide6.xml><?xml version="1.0" encoding="utf-8"?>
+<p:notes xmlns:a="http://schemas.openxmlformats.org/drawingml/2006/main" xmlns:r="http://schemas.openxmlformats.org/officeDocument/2006/relationships" xmlns:p="http://schemas.openxmlformats.org/presentationml/2006/main" showMasterSp="0" showMasterPhAnim="0">
+  <p:cSld>
+    <p:spTree>
+      <p:nvGrpSpPr>
+        <p:cNvPr id="1" name="Shape 59"/>
+        <p:cNvGrpSpPr/>
+        <p:nvPr/>
+      </p:nvGrpSpPr>
+      <p:grpSpPr>
+        <a:xfrm>
+          <a:off x="0" y="0"/>
+          <a:ext cx="0" cy="0"/>
+          <a:chOff x="0" y="0"/>
+          <a:chExt cx="0" cy="0"/>
+        </a:xfrm>
+      </p:grpSpPr>
+      <p:sp>
+        <p:nvSpPr>
+          <p:cNvPr id="60" name="Shape 60"/>
+          <p:cNvSpPr>
+            <a:spLocks noGrp="1" noRot="1" noChangeAspect="1"/>
+          </p:cNvSpPr>
+          <p:nvPr>
+            <p:ph type="sldImg" idx="2"/>
+          </p:nvPr>
+        </p:nvSpPr>
+        <p:spPr>
+          <a:xfrm>
+            <a:off x="1143225" y="685800"/>
+            <a:ext cx="4572299" cy="3429000"/>
+          </a:xfrm>
+          <a:custGeom>
+            <a:avLst/>
+            <a:gdLst/>
+            <a:ahLst/>
+            <a:cxnLst/>
+            <a:rect l="0" t="0" r="0" b="0"/>
+            <a:pathLst>
+              <a:path w="120000" h="120000" extrusionOk="0">
+                <a:moveTo>
+                  <a:pt x="0" y="0"/>
+                </a:moveTo>
+                <a:lnTo>
+                  <a:pt x="120000" y="0"/>
+                </a:lnTo>
+                <a:lnTo>
+                  <a:pt x="120000" y="120000"/>
+                </a:lnTo>
+                <a:lnTo>
+                  <a:pt x="0" y="120000"/>
+                </a:lnTo>
+                <a:close/>
+              </a:path>
+            </a:pathLst>
+          </a:custGeom>
+          <a:noFill/>
+          <a:ln w="9525" cap="flat">
+            <a:solidFill>
+              <a:srgbClr val="000000"/>
+            </a:solidFill>
+            <a:prstDash val="solid"/>
+            <a:round/>
+            <a:headEnd type="none" w="med" len="med"/>
+            <a:tailEnd type="none" w="med" len="med"/>
+          </a:ln>
+        </p:spPr>
+      </p:sp>
+      <p:sp>
+        <p:nvSpPr>
+          <p:cNvPr id="61" name="Shape 61"/>
+          <p:cNvSpPr txBox="1">
+            <a:spLocks noGrp="1"/>
+          </p:cNvSpPr>
+          <p:nvPr>
+            <p:ph type="body" idx="1"/>
+          </p:nvPr>
+        </p:nvSpPr>
+        <p:spPr>
+          <a:xfrm>
+            <a:off x="685800" y="4343400"/>
+            <a:ext cx="5486399" cy="4114800"/>
+          </a:xfrm>
+          <a:prstGeom prst="rect">
+            <a:avLst/>
+          </a:prstGeom>
+        </p:spPr>
+        <p:txBody>
+          <a:bodyPr lIns="91425" tIns="91425" rIns="91425" bIns="91425" anchor="t" anchorCtr="0">
+            <a:noAutofit/>
+          </a:bodyPr>
+          <a:lstStyle/>
+          <a:p>
+            <a:pPr lvl="0" rtl="0">
+              <a:spcBef>
+                <a:spcPts val="0"/>
+              </a:spcBef>
+              <a:buNone/>
+            </a:pPr>
+            <a:endParaRPr/>
+          </a:p>
+        </p:txBody>
+      </p:sp>
+    </p:spTree>
+    <p:extLst>
+      <p:ext uri="{BB962C8B-B14F-4D97-AF65-F5344CB8AC3E}">
+        <p14:creationId xmlns:p14="http://schemas.microsoft.com/office/powerpoint/2010/main" val="2583328964"/>
+      </p:ext>
+    </p:extLst>
+  </p:cSld>
+  <p:clrMapOvr>
+    <a:masterClrMapping/>
+  </p:clrMapOvr>
+</p:notes>
+</file>
+
+<file path=ppt/notesSlides/notesSlide7.xml><?xml version="1.0" encoding="utf-8"?>
+<p:notes xmlns:a="http://schemas.openxmlformats.org/drawingml/2006/main" xmlns:r="http://schemas.openxmlformats.org/officeDocument/2006/relationships" xmlns:p="http://schemas.openxmlformats.org/presentationml/2006/main" showMasterSp="0" showMasterPhAnim="0">
+  <p:cSld>
+    <p:spTree>
+      <p:nvGrpSpPr>
+        <p:cNvPr id="1" name="Shape 59"/>
+        <p:cNvGrpSpPr/>
+        <p:nvPr/>
+      </p:nvGrpSpPr>
+      <p:grpSpPr>
+        <a:xfrm>
+          <a:off x="0" y="0"/>
+          <a:ext cx="0" cy="0"/>
+          <a:chOff x="0" y="0"/>
+          <a:chExt cx="0" cy="0"/>
+        </a:xfrm>
+      </p:grpSpPr>
+      <p:sp>
+        <p:nvSpPr>
+          <p:cNvPr id="60" name="Shape 60"/>
+          <p:cNvSpPr>
+            <a:spLocks noGrp="1" noRot="1" noChangeAspect="1"/>
+          </p:cNvSpPr>
+          <p:nvPr>
+            <p:ph type="sldImg" idx="2"/>
+          </p:nvPr>
+        </p:nvSpPr>
+        <p:spPr>
+          <a:xfrm>
+            <a:off x="1143000" y="685800"/>
+            <a:ext cx="4572000" cy="3429000"/>
+          </a:xfrm>
+          <a:custGeom>
+            <a:avLst/>
+            <a:gdLst/>
+            <a:ahLst/>
+            <a:cxnLst/>
+            <a:rect l="0" t="0" r="0" b="0"/>
+            <a:pathLst>
+              <a:path w="120000" h="120000" extrusionOk="0">
+                <a:moveTo>
+                  <a:pt x="0" y="0"/>
+                </a:moveTo>
+                <a:lnTo>
+                  <a:pt x="120000" y="0"/>
+                </a:lnTo>
+                <a:lnTo>
+                  <a:pt x="120000" y="120000"/>
+                </a:lnTo>
+                <a:lnTo>
+                  <a:pt x="0" y="120000"/>
+                </a:lnTo>
+                <a:close/>
+              </a:path>
+            </a:pathLst>
+          </a:custGeom>
+          <a:noFill/>
+          <a:ln w="9525" cap="flat">
+            <a:solidFill>
+              <a:srgbClr val="000000"/>
+            </a:solidFill>
+            <a:prstDash val="solid"/>
+            <a:round/>
+            <a:headEnd type="none" w="med" len="med"/>
+            <a:tailEnd type="none" w="med" len="med"/>
+          </a:ln>
+        </p:spPr>
+      </p:sp>
+      <p:sp>
+        <p:nvSpPr>
+          <p:cNvPr id="61" name="Shape 61"/>
+          <p:cNvSpPr txBox="1">
+            <a:spLocks noGrp="1"/>
+          </p:cNvSpPr>
+          <p:nvPr>
+            <p:ph type="body" idx="1"/>
+          </p:nvPr>
+        </p:nvSpPr>
+        <p:spPr>
+          <a:xfrm>
+            <a:off x="685800" y="4343400"/>
+            <a:ext cx="5486399" cy="4114800"/>
+          </a:xfrm>
+          <a:prstGeom prst="rect">
+            <a:avLst/>
+          </a:prstGeom>
+        </p:spPr>
+        <p:txBody>
+          <a:bodyPr lIns="91425" tIns="91425" rIns="91425" bIns="91425" anchor="t" anchorCtr="0">
+            <a:noAutofit/>
+          </a:bodyPr>
+          <a:lstStyle/>
+          <a:p>
+            <a:pPr lvl="0" rtl="0">
+              <a:spcBef>
+                <a:spcPts val="0"/>
+              </a:spcBef>
+              <a:buNone/>
+            </a:pPr>
+            <a:endParaRPr/>
+          </a:p>
+        </p:txBody>
+      </p:sp>
+    </p:spTree>
+    <p:extLst>
+      <p:ext uri="{BB962C8B-B14F-4D97-AF65-F5344CB8AC3E}">
+        <p14:creationId xmlns:p14="http://schemas.microsoft.com/office/powerpoint/2010/main" val="1383294274"/>
+      </p:ext>
+    </p:extLst>
+  </p:cSld>
+  <p:clrMapOvr>
+    <a:masterClrMapping/>
+  </p:clrMapOvr>
+</p:notes>
+</file>
+
+<file path=ppt/notesSlides/notesSlide8.xml><?xml version="1.0" encoding="utf-8"?>
+<p:notes xmlns:a="http://schemas.openxmlformats.org/drawingml/2006/main" xmlns:r="http://schemas.openxmlformats.org/officeDocument/2006/relationships" xmlns:p="http://schemas.openxmlformats.org/presentationml/2006/main" showMasterSp="0" showMasterPhAnim="0">
+  <p:cSld>
+    <p:spTree>
+      <p:nvGrpSpPr>
+        <p:cNvPr id="1" name="Shape 59"/>
+        <p:cNvGrpSpPr/>
+        <p:nvPr/>
+      </p:nvGrpSpPr>
+      <p:grpSpPr>
+        <a:xfrm>
+          <a:off x="0" y="0"/>
+          <a:ext cx="0" cy="0"/>
+          <a:chOff x="0" y="0"/>
+          <a:chExt cx="0" cy="0"/>
+        </a:xfrm>
+      </p:grpSpPr>
+      <p:sp>
+        <p:nvSpPr>
+          <p:cNvPr id="60" name="Shape 60"/>
+          <p:cNvSpPr>
+            <a:spLocks noGrp="1" noRot="1" noChangeAspect="1"/>
+          </p:cNvSpPr>
+          <p:nvPr>
+            <p:ph type="sldImg" idx="2"/>
+          </p:nvPr>
+        </p:nvSpPr>
+        <p:spPr>
+          <a:xfrm>
+            <a:off x="1143225" y="685800"/>
+            <a:ext cx="4572299" cy="3429000"/>
+          </a:xfrm>
+          <a:custGeom>
+            <a:avLst/>
+            <a:gdLst/>
+            <a:ahLst/>
+            <a:cxnLst/>
+            <a:rect l="0" t="0" r="0" b="0"/>
+            <a:pathLst>
+              <a:path w="120000" h="120000" extrusionOk="0">
+                <a:moveTo>
+                  <a:pt x="0" y="0"/>
+                </a:moveTo>
+                <a:lnTo>
+                  <a:pt x="120000" y="0"/>
+                </a:lnTo>
+                <a:lnTo>
+                  <a:pt x="120000" y="120000"/>
+                </a:lnTo>
+                <a:lnTo>
+                  <a:pt x="0" y="120000"/>
+                </a:lnTo>
+                <a:close/>
+              </a:path>
+            </a:pathLst>
+          </a:custGeom>
+          <a:noFill/>
+          <a:ln w="9525" cap="flat">
+            <a:solidFill>
+              <a:srgbClr val="000000"/>
+            </a:solidFill>
+            <a:prstDash val="solid"/>
+            <a:round/>
+            <a:headEnd type="none" w="med" len="med"/>
+            <a:tailEnd type="none" w="med" len="med"/>
+          </a:ln>
+        </p:spPr>
+      </p:sp>
+      <p:sp>
+        <p:nvSpPr>
+          <p:cNvPr id="61" name="Shape 61"/>
+          <p:cNvSpPr txBox="1">
+            <a:spLocks noGrp="1"/>
+          </p:cNvSpPr>
+          <p:nvPr>
+            <p:ph type="body" idx="1"/>
+          </p:nvPr>
+        </p:nvSpPr>
+        <p:spPr>
+          <a:xfrm>
+            <a:off x="685800" y="4343400"/>
+            <a:ext cx="5486399" cy="4114800"/>
+          </a:xfrm>
+          <a:prstGeom prst="rect">
+            <a:avLst/>
+          </a:prstGeom>
+        </p:spPr>
+        <p:txBody>
+          <a:bodyPr lIns="91425" tIns="91425" rIns="91425" bIns="91425" anchor="t" anchorCtr="0">
+            <a:noAutofit/>
+          </a:bodyPr>
+          <a:lstStyle/>
+          <a:p>
+            <a:pPr lvl="0" rtl="0">
+              <a:spcBef>
+                <a:spcPts val="0"/>
+              </a:spcBef>
+              <a:buNone/>
+            </a:pPr>
+            <a:endParaRPr/>
+          </a:p>
+        </p:txBody>
+      </p:sp>
+    </p:spTree>
+    <p:extLst>
+      <p:ext uri="{BB962C8B-B14F-4D97-AF65-F5344CB8AC3E}">
+        <p14:creationId xmlns:p14="http://schemas.microsoft.com/office/powerpoint/2010/main" val="3041491646"/>
+      </p:ext>
+    </p:extLst>
   </p:cSld>
   <p:clrMapOvr>
     <a:masterClrMapping/>
@@ -6395,7 +7097,371 @@
               </a:spcBef>
               <a:buNone/>
             </a:pPr>
-            <a:endParaRPr sz="3000">
+            <a:r>
+              <a:rPr lang="en-US" sz="3000" dirty="0">
+                <a:solidFill>
+                  <a:srgbClr val="003366"/>
+                </a:solidFill>
+              </a:rPr>
+              <a:t>Presentation Outline</a:t>
+            </a:r>
+            <a:endParaRPr sz="3000" dirty="0">
+              <a:solidFill>
+                <a:srgbClr val="003366"/>
+              </a:solidFill>
+            </a:endParaRPr>
+          </a:p>
+        </p:txBody>
+      </p:sp>
+      <p:sp>
+        <p:nvSpPr>
+          <p:cNvPr id="52" name="Shape 52"/>
+          <p:cNvSpPr txBox="1">
+            <a:spLocks noGrp="1"/>
+          </p:cNvSpPr>
+          <p:nvPr>
+            <p:ph type="body" idx="1"/>
+          </p:nvPr>
+        </p:nvSpPr>
+        <p:spPr>
+          <a:xfrm>
+            <a:off x="457200" y="766050"/>
+            <a:ext cx="8229600" cy="2662950"/>
+          </a:xfrm>
+          <a:prstGeom prst="rect">
+            <a:avLst/>
+          </a:prstGeom>
+        </p:spPr>
+        <p:txBody>
+          <a:bodyPr lIns="91425" tIns="91425" rIns="91425" bIns="91425" anchor="ctr" anchorCtr="0">
+            <a:noAutofit/>
+          </a:bodyPr>
+          <a:lstStyle/>
+          <a:p>
+            <a:pPr marL="342900" indent="-342900" algn="just">
+              <a:lnSpc>
+                <a:spcPct val="150000"/>
+              </a:lnSpc>
+            </a:pPr>
+            <a:r>
+              <a:rPr lang="en-US" sz="2200" dirty="0">
+                <a:solidFill>
+                  <a:srgbClr val="003366"/>
+                </a:solidFill>
+              </a:rPr>
+              <a:t>Problem Introduction</a:t>
+            </a:r>
+          </a:p>
+          <a:p>
+            <a:pPr marL="342900" indent="-342900" algn="just"/>
+            <a:r>
+              <a:rPr lang="en-US" sz="2200" dirty="0">
+                <a:solidFill>
+                  <a:srgbClr val="003366"/>
+                </a:solidFill>
+              </a:rPr>
+              <a:t>Proposed Architecture</a:t>
+            </a:r>
+          </a:p>
+          <a:p>
+            <a:pPr marL="342900" indent="-342900">
+              <a:lnSpc>
+                <a:spcPct val="150000"/>
+              </a:lnSpc>
+            </a:pPr>
+            <a:r>
+              <a:rPr lang="en-US" sz="2200" dirty="0">
+                <a:solidFill>
+                  <a:srgbClr val="003366"/>
+                </a:solidFill>
+              </a:rPr>
+              <a:t>Experiment Results</a:t>
+            </a:r>
+          </a:p>
+          <a:p>
+            <a:pPr marL="342900" indent="-342900">
+              <a:lnSpc>
+                <a:spcPct val="150000"/>
+              </a:lnSpc>
+            </a:pPr>
+            <a:r>
+              <a:rPr lang="en-US" sz="2200">
+                <a:solidFill>
+                  <a:srgbClr val="003366"/>
+                </a:solidFill>
+              </a:rPr>
+              <a:t>Conclusion</a:t>
+            </a:r>
+            <a:endParaRPr sz="2200" dirty="0">
+              <a:solidFill>
+                <a:srgbClr val="003366"/>
+              </a:solidFill>
+            </a:endParaRPr>
+          </a:p>
+        </p:txBody>
+      </p:sp>
+      <p:pic>
+        <p:nvPicPr>
+          <p:cNvPr id="53" name="Shape 53"/>
+          <p:cNvPicPr preferRelativeResize="0"/>
+          <p:nvPr/>
+        </p:nvPicPr>
+        <p:blipFill>
+          <a:blip r:embed="rId3">
+            <a:alphaModFix/>
+          </a:blip>
+          <a:stretch>
+            <a:fillRect/>
+          </a:stretch>
+        </p:blipFill>
+        <p:spPr>
+          <a:xfrm>
+            <a:off x="82450" y="65950"/>
+            <a:ext cx="464900" cy="498650"/>
+          </a:xfrm>
+          <a:prstGeom prst="rect">
+            <a:avLst/>
+          </a:prstGeom>
+          <a:noFill/>
+          <a:ln>
+            <a:noFill/>
+          </a:ln>
+        </p:spPr>
+      </p:pic>
+      <p:pic>
+        <p:nvPicPr>
+          <p:cNvPr id="54" name="Shape 54"/>
+          <p:cNvPicPr preferRelativeResize="0"/>
+          <p:nvPr/>
+        </p:nvPicPr>
+        <p:blipFill>
+          <a:blip r:embed="rId4">
+            <a:alphaModFix/>
+          </a:blip>
+          <a:stretch>
+            <a:fillRect/>
+          </a:stretch>
+        </p:blipFill>
+        <p:spPr>
+          <a:xfrm>
+            <a:off x="0" y="630539"/>
+            <a:ext cx="9143998" cy="97471"/>
+          </a:xfrm>
+          <a:prstGeom prst="rect">
+            <a:avLst/>
+          </a:prstGeom>
+          <a:noFill/>
+          <a:ln>
+            <a:noFill/>
+          </a:ln>
+        </p:spPr>
+      </p:pic>
+      <p:cxnSp>
+        <p:nvCxnSpPr>
+          <p:cNvPr id="55" name="Shape 55"/>
+          <p:cNvCxnSpPr/>
+          <p:nvPr/>
+        </p:nvCxnSpPr>
+        <p:spPr>
+          <a:xfrm rot="10800000">
+            <a:off x="691550" y="125"/>
+            <a:ext cx="0" cy="630299"/>
+          </a:xfrm>
+          <a:prstGeom prst="straightConnector1">
+            <a:avLst/>
+          </a:prstGeom>
+          <a:noFill/>
+          <a:ln w="9525" cap="flat">
+            <a:solidFill>
+              <a:srgbClr val="003366"/>
+            </a:solidFill>
+            <a:prstDash val="solid"/>
+            <a:round/>
+            <a:headEnd type="none" w="lg" len="lg"/>
+            <a:tailEnd type="none" w="lg" len="lg"/>
+          </a:ln>
+        </p:spPr>
+      </p:cxnSp>
+      <p:sp>
+        <p:nvSpPr>
+          <p:cNvPr id="56" name="Shape 56"/>
+          <p:cNvSpPr txBox="1"/>
+          <p:nvPr/>
+        </p:nvSpPr>
+        <p:spPr>
+          <a:xfrm>
+            <a:off x="6783700" y="6531000"/>
+            <a:ext cx="2599200" cy="363899"/>
+          </a:xfrm>
+          <a:prstGeom prst="rect">
+            <a:avLst/>
+          </a:prstGeom>
+          <a:noFill/>
+          <a:ln>
+            <a:noFill/>
+          </a:ln>
+        </p:spPr>
+        <p:txBody>
+          <a:bodyPr lIns="91425" tIns="91425" rIns="91425" bIns="91425" anchor="t" anchorCtr="0">
+            <a:noAutofit/>
+          </a:bodyPr>
+          <a:lstStyle/>
+          <a:p>
+            <a:pPr lvl="0" rtl="0">
+              <a:spcBef>
+                <a:spcPts val="0"/>
+              </a:spcBef>
+              <a:buNone/>
+            </a:pPr>
+            <a:r>
+              <a:rPr lang="it" sz="1200" b="1">
+                <a:solidFill>
+                  <a:srgbClr val="FFFFFF"/>
+                </a:solidFill>
+              </a:rPr>
+              <a:t>POLITECNICO DI MILANO</a:t>
+            </a:r>
+          </a:p>
+        </p:txBody>
+      </p:sp>
+      <p:pic>
+        <p:nvPicPr>
+          <p:cNvPr id="57" name="Shape 57"/>
+          <p:cNvPicPr preferRelativeResize="0"/>
+          <p:nvPr/>
+        </p:nvPicPr>
+        <p:blipFill>
+          <a:blip r:embed="rId5">
+            <a:alphaModFix/>
+          </a:blip>
+          <a:stretch>
+            <a:fillRect/>
+          </a:stretch>
+        </p:blipFill>
+        <p:spPr>
+          <a:xfrm>
+            <a:off x="0" y="6571225"/>
+            <a:ext cx="9144000" cy="286775"/>
+          </a:xfrm>
+          <a:prstGeom prst="rect">
+            <a:avLst/>
+          </a:prstGeom>
+          <a:noFill/>
+          <a:ln>
+            <a:noFill/>
+          </a:ln>
+        </p:spPr>
+      </p:pic>
+      <p:sp>
+        <p:nvSpPr>
+          <p:cNvPr id="58" name="Shape 58"/>
+          <p:cNvSpPr txBox="1">
+            <a:spLocks noGrp="1"/>
+          </p:cNvSpPr>
+          <p:nvPr>
+            <p:ph type="ctrTitle" idx="2"/>
+          </p:nvPr>
+        </p:nvSpPr>
+        <p:spPr>
+          <a:xfrm>
+            <a:off x="2196425" y="6531000"/>
+            <a:ext cx="3238799" cy="424199"/>
+          </a:xfrm>
+          <a:prstGeom prst="rect">
+            <a:avLst/>
+          </a:prstGeom>
+        </p:spPr>
+        <p:txBody>
+          <a:bodyPr lIns="91425" tIns="91425" rIns="91425" bIns="91425" anchor="ctr" anchorCtr="0">
+            <a:noAutofit/>
+          </a:bodyPr>
+          <a:lstStyle/>
+          <a:p>
+            <a:pPr lvl="0" indent="457200" rtl="0">
+              <a:lnSpc>
+                <a:spcPct val="115000"/>
+              </a:lnSpc>
+              <a:spcBef>
+                <a:spcPts val="0"/>
+              </a:spcBef>
+              <a:buNone/>
+            </a:pPr>
+            <a:endParaRPr sz="1300">
+              <a:solidFill>
+                <a:srgbClr val="003366"/>
+              </a:solidFill>
+            </a:endParaRPr>
+          </a:p>
+        </p:txBody>
+      </p:sp>
+    </p:spTree>
+  </p:cSld>
+  <p:clrMapOvr>
+    <a:masterClrMapping/>
+  </p:clrMapOvr>
+  <p:transition spd="slow">
+    <p:cut/>
+  </p:transition>
+</p:sld>
+</file>
+
+<file path=ppt/slides/slide3.xml><?xml version="1.0" encoding="utf-8"?>
+<p:sld xmlns:a="http://schemas.openxmlformats.org/drawingml/2006/main" xmlns:r="http://schemas.openxmlformats.org/officeDocument/2006/relationships" xmlns:p="http://schemas.openxmlformats.org/presentationml/2006/main">
+  <p:cSld>
+    <p:spTree>
+      <p:nvGrpSpPr>
+        <p:cNvPr id="1" name="Shape 50"/>
+        <p:cNvGrpSpPr/>
+        <p:nvPr/>
+      </p:nvGrpSpPr>
+      <p:grpSpPr>
+        <a:xfrm>
+          <a:off x="0" y="0"/>
+          <a:ext cx="0" cy="0"/>
+          <a:chOff x="0" y="0"/>
+          <a:chExt cx="0" cy="0"/>
+        </a:xfrm>
+      </p:grpSpPr>
+      <p:sp>
+        <p:nvSpPr>
+          <p:cNvPr id="51" name="Shape 51"/>
+          <p:cNvSpPr txBox="1">
+            <a:spLocks noGrp="1"/>
+          </p:cNvSpPr>
+          <p:nvPr>
+            <p:ph type="title"/>
+          </p:nvPr>
+        </p:nvSpPr>
+        <p:spPr>
+          <a:xfrm>
+            <a:off x="837450" y="131950"/>
+            <a:ext cx="8136900" cy="498599"/>
+          </a:xfrm>
+          <a:prstGeom prst="rect">
+            <a:avLst/>
+          </a:prstGeom>
+        </p:spPr>
+        <p:txBody>
+          <a:bodyPr lIns="91425" tIns="91425" rIns="91425" bIns="91425" anchor="b" anchorCtr="0">
+            <a:noAutofit/>
+          </a:bodyPr>
+          <a:lstStyle/>
+          <a:p>
+            <a:pPr lvl="0" rtl="0">
+              <a:spcBef>
+                <a:spcPts val="0"/>
+              </a:spcBef>
+              <a:buNone/>
+            </a:pPr>
+            <a:r>
+              <a:rPr lang="en-US" sz="3000" dirty="0">
+                <a:solidFill>
+                  <a:srgbClr val="003366"/>
+                </a:solidFill>
+              </a:rPr>
+              <a:t>What is Anomaly Detection ?</a:t>
+            </a:r>
+            <a:endParaRPr sz="3000" dirty="0">
               <a:solidFill>
                 <a:srgbClr val="003366"/>
               </a:solidFill>
@@ -6637,6 +7703,1552 @@
         </p:txBody>
       </p:sp>
     </p:spTree>
+    <p:extLst>
+      <p:ext uri="{BB962C8B-B14F-4D97-AF65-F5344CB8AC3E}">
+        <p14:creationId xmlns:p14="http://schemas.microsoft.com/office/powerpoint/2010/main" val="2098608528"/>
+      </p:ext>
+    </p:extLst>
+  </p:cSld>
+  <p:clrMapOvr>
+    <a:masterClrMapping/>
+  </p:clrMapOvr>
+  <p:transition spd="slow">
+    <p:cut/>
+  </p:transition>
+</p:sld>
+</file>
+
+<file path=ppt/slides/slide4.xml><?xml version="1.0" encoding="utf-8"?>
+<p:sld xmlns:a="http://schemas.openxmlformats.org/drawingml/2006/main" xmlns:r="http://schemas.openxmlformats.org/officeDocument/2006/relationships" xmlns:p="http://schemas.openxmlformats.org/presentationml/2006/main">
+  <p:cSld>
+    <p:spTree>
+      <p:nvGrpSpPr>
+        <p:cNvPr id="1" name="Shape 50"/>
+        <p:cNvGrpSpPr/>
+        <p:nvPr/>
+      </p:nvGrpSpPr>
+      <p:grpSpPr>
+        <a:xfrm>
+          <a:off x="0" y="0"/>
+          <a:ext cx="0" cy="0"/>
+          <a:chOff x="0" y="0"/>
+          <a:chExt cx="0" cy="0"/>
+        </a:xfrm>
+      </p:grpSpPr>
+      <p:sp>
+        <p:nvSpPr>
+          <p:cNvPr id="51" name="Shape 51"/>
+          <p:cNvSpPr txBox="1">
+            <a:spLocks noGrp="1"/>
+          </p:cNvSpPr>
+          <p:nvPr>
+            <p:ph type="title"/>
+          </p:nvPr>
+        </p:nvSpPr>
+        <p:spPr>
+          <a:xfrm>
+            <a:off x="837450" y="131950"/>
+            <a:ext cx="8136900" cy="498599"/>
+          </a:xfrm>
+          <a:prstGeom prst="rect">
+            <a:avLst/>
+          </a:prstGeom>
+        </p:spPr>
+        <p:txBody>
+          <a:bodyPr lIns="91425" tIns="91425" rIns="91425" bIns="91425" anchor="b" anchorCtr="0">
+            <a:noAutofit/>
+          </a:bodyPr>
+          <a:lstStyle/>
+          <a:p>
+            <a:pPr lvl="0" rtl="0">
+              <a:spcBef>
+                <a:spcPts val="0"/>
+              </a:spcBef>
+              <a:buNone/>
+            </a:pPr>
+            <a:endParaRPr sz="3000">
+              <a:solidFill>
+                <a:srgbClr val="003366"/>
+              </a:solidFill>
+            </a:endParaRPr>
+          </a:p>
+        </p:txBody>
+      </p:sp>
+      <p:sp>
+        <p:nvSpPr>
+          <p:cNvPr id="52" name="Shape 52"/>
+          <p:cNvSpPr txBox="1">
+            <a:spLocks noGrp="1"/>
+          </p:cNvSpPr>
+          <p:nvPr>
+            <p:ph type="body" idx="1"/>
+          </p:nvPr>
+        </p:nvSpPr>
+        <p:spPr>
+          <a:xfrm>
+            <a:off x="457200" y="766050"/>
+            <a:ext cx="8229600" cy="5325900"/>
+          </a:xfrm>
+          <a:prstGeom prst="rect">
+            <a:avLst/>
+          </a:prstGeom>
+        </p:spPr>
+        <p:txBody>
+          <a:bodyPr lIns="91425" tIns="91425" rIns="91425" bIns="91425" anchor="ctr" anchorCtr="0">
+            <a:noAutofit/>
+          </a:bodyPr>
+          <a:lstStyle/>
+          <a:p>
+            <a:pPr lvl="0" algn="just" rtl="0">
+              <a:spcBef>
+                <a:spcPts val="0"/>
+              </a:spcBef>
+              <a:buNone/>
+            </a:pPr>
+            <a:endParaRPr sz="2200">
+              <a:solidFill>
+                <a:srgbClr val="003366"/>
+              </a:solidFill>
+            </a:endParaRPr>
+          </a:p>
+        </p:txBody>
+      </p:sp>
+      <p:pic>
+        <p:nvPicPr>
+          <p:cNvPr id="53" name="Shape 53"/>
+          <p:cNvPicPr preferRelativeResize="0"/>
+          <p:nvPr/>
+        </p:nvPicPr>
+        <p:blipFill>
+          <a:blip r:embed="rId3">
+            <a:alphaModFix/>
+          </a:blip>
+          <a:stretch>
+            <a:fillRect/>
+          </a:stretch>
+        </p:blipFill>
+        <p:spPr>
+          <a:xfrm>
+            <a:off x="82450" y="65950"/>
+            <a:ext cx="464900" cy="498650"/>
+          </a:xfrm>
+          <a:prstGeom prst="rect">
+            <a:avLst/>
+          </a:prstGeom>
+          <a:noFill/>
+          <a:ln>
+            <a:noFill/>
+          </a:ln>
+        </p:spPr>
+      </p:pic>
+      <p:pic>
+        <p:nvPicPr>
+          <p:cNvPr id="54" name="Shape 54"/>
+          <p:cNvPicPr preferRelativeResize="0"/>
+          <p:nvPr/>
+        </p:nvPicPr>
+        <p:blipFill>
+          <a:blip r:embed="rId4">
+            <a:alphaModFix/>
+          </a:blip>
+          <a:stretch>
+            <a:fillRect/>
+          </a:stretch>
+        </p:blipFill>
+        <p:spPr>
+          <a:xfrm>
+            <a:off x="0" y="630539"/>
+            <a:ext cx="9143998" cy="97471"/>
+          </a:xfrm>
+          <a:prstGeom prst="rect">
+            <a:avLst/>
+          </a:prstGeom>
+          <a:noFill/>
+          <a:ln>
+            <a:noFill/>
+          </a:ln>
+        </p:spPr>
+      </p:pic>
+      <p:cxnSp>
+        <p:nvCxnSpPr>
+          <p:cNvPr id="55" name="Shape 55"/>
+          <p:cNvCxnSpPr/>
+          <p:nvPr/>
+        </p:nvCxnSpPr>
+        <p:spPr>
+          <a:xfrm rot="10800000">
+            <a:off x="691550" y="125"/>
+            <a:ext cx="0" cy="630299"/>
+          </a:xfrm>
+          <a:prstGeom prst="straightConnector1">
+            <a:avLst/>
+          </a:prstGeom>
+          <a:noFill/>
+          <a:ln w="9525" cap="flat">
+            <a:solidFill>
+              <a:srgbClr val="003366"/>
+            </a:solidFill>
+            <a:prstDash val="solid"/>
+            <a:round/>
+            <a:headEnd type="none" w="lg" len="lg"/>
+            <a:tailEnd type="none" w="lg" len="lg"/>
+          </a:ln>
+        </p:spPr>
+      </p:cxnSp>
+      <p:sp>
+        <p:nvSpPr>
+          <p:cNvPr id="56" name="Shape 56"/>
+          <p:cNvSpPr txBox="1"/>
+          <p:nvPr/>
+        </p:nvSpPr>
+        <p:spPr>
+          <a:xfrm>
+            <a:off x="6783700" y="6531000"/>
+            <a:ext cx="2599200" cy="363899"/>
+          </a:xfrm>
+          <a:prstGeom prst="rect">
+            <a:avLst/>
+          </a:prstGeom>
+          <a:noFill/>
+          <a:ln>
+            <a:noFill/>
+          </a:ln>
+        </p:spPr>
+        <p:txBody>
+          <a:bodyPr lIns="91425" tIns="91425" rIns="91425" bIns="91425" anchor="t" anchorCtr="0">
+            <a:noAutofit/>
+          </a:bodyPr>
+          <a:lstStyle/>
+          <a:p>
+            <a:pPr lvl="0" rtl="0">
+              <a:spcBef>
+                <a:spcPts val="0"/>
+              </a:spcBef>
+              <a:buNone/>
+            </a:pPr>
+            <a:r>
+              <a:rPr lang="it" sz="1200" b="1">
+                <a:solidFill>
+                  <a:srgbClr val="FFFFFF"/>
+                </a:solidFill>
+              </a:rPr>
+              <a:t>POLITECNICO DI MILANO</a:t>
+            </a:r>
+          </a:p>
+        </p:txBody>
+      </p:sp>
+      <p:pic>
+        <p:nvPicPr>
+          <p:cNvPr id="57" name="Shape 57"/>
+          <p:cNvPicPr preferRelativeResize="0"/>
+          <p:nvPr/>
+        </p:nvPicPr>
+        <p:blipFill>
+          <a:blip r:embed="rId5">
+            <a:alphaModFix/>
+          </a:blip>
+          <a:stretch>
+            <a:fillRect/>
+          </a:stretch>
+        </p:blipFill>
+        <p:spPr>
+          <a:xfrm>
+            <a:off x="0" y="6571225"/>
+            <a:ext cx="9144000" cy="286775"/>
+          </a:xfrm>
+          <a:prstGeom prst="rect">
+            <a:avLst/>
+          </a:prstGeom>
+          <a:noFill/>
+          <a:ln>
+            <a:noFill/>
+          </a:ln>
+        </p:spPr>
+      </p:pic>
+      <p:sp>
+        <p:nvSpPr>
+          <p:cNvPr id="58" name="Shape 58"/>
+          <p:cNvSpPr txBox="1">
+            <a:spLocks noGrp="1"/>
+          </p:cNvSpPr>
+          <p:nvPr>
+            <p:ph type="ctrTitle" idx="2"/>
+          </p:nvPr>
+        </p:nvSpPr>
+        <p:spPr>
+          <a:xfrm>
+            <a:off x="2196425" y="6531000"/>
+            <a:ext cx="3238799" cy="424199"/>
+          </a:xfrm>
+          <a:prstGeom prst="rect">
+            <a:avLst/>
+          </a:prstGeom>
+        </p:spPr>
+        <p:txBody>
+          <a:bodyPr lIns="91425" tIns="91425" rIns="91425" bIns="91425" anchor="ctr" anchorCtr="0">
+            <a:noAutofit/>
+          </a:bodyPr>
+          <a:lstStyle/>
+          <a:p>
+            <a:pPr lvl="0" indent="457200" rtl="0">
+              <a:lnSpc>
+                <a:spcPct val="115000"/>
+              </a:lnSpc>
+              <a:spcBef>
+                <a:spcPts val="0"/>
+              </a:spcBef>
+              <a:buNone/>
+            </a:pPr>
+            <a:endParaRPr sz="1300">
+              <a:solidFill>
+                <a:srgbClr val="003366"/>
+              </a:solidFill>
+            </a:endParaRPr>
+          </a:p>
+        </p:txBody>
+      </p:sp>
+    </p:spTree>
+    <p:extLst>
+      <p:ext uri="{BB962C8B-B14F-4D97-AF65-F5344CB8AC3E}">
+        <p14:creationId xmlns:p14="http://schemas.microsoft.com/office/powerpoint/2010/main" val="2041188219"/>
+      </p:ext>
+    </p:extLst>
+  </p:cSld>
+  <p:clrMapOvr>
+    <a:masterClrMapping/>
+  </p:clrMapOvr>
+  <p:transition spd="slow">
+    <p:cut/>
+  </p:transition>
+</p:sld>
+</file>
+
+<file path=ppt/slides/slide5.xml><?xml version="1.0" encoding="utf-8"?>
+<p:sld xmlns:a="http://schemas.openxmlformats.org/drawingml/2006/main" xmlns:r="http://schemas.openxmlformats.org/officeDocument/2006/relationships" xmlns:p="http://schemas.openxmlformats.org/presentationml/2006/main">
+  <p:cSld>
+    <p:spTree>
+      <p:nvGrpSpPr>
+        <p:cNvPr id="1" name="Shape 50"/>
+        <p:cNvGrpSpPr/>
+        <p:nvPr/>
+      </p:nvGrpSpPr>
+      <p:grpSpPr>
+        <a:xfrm>
+          <a:off x="0" y="0"/>
+          <a:ext cx="0" cy="0"/>
+          <a:chOff x="0" y="0"/>
+          <a:chExt cx="0" cy="0"/>
+        </a:xfrm>
+      </p:grpSpPr>
+      <p:sp>
+        <p:nvSpPr>
+          <p:cNvPr id="51" name="Shape 51"/>
+          <p:cNvSpPr txBox="1">
+            <a:spLocks noGrp="1"/>
+          </p:cNvSpPr>
+          <p:nvPr>
+            <p:ph type="title"/>
+          </p:nvPr>
+        </p:nvSpPr>
+        <p:spPr>
+          <a:xfrm>
+            <a:off x="837450" y="131950"/>
+            <a:ext cx="8136900" cy="498599"/>
+          </a:xfrm>
+          <a:prstGeom prst="rect">
+            <a:avLst/>
+          </a:prstGeom>
+        </p:spPr>
+        <p:txBody>
+          <a:bodyPr lIns="91425" tIns="91425" rIns="91425" bIns="91425" anchor="b" anchorCtr="0">
+            <a:noAutofit/>
+          </a:bodyPr>
+          <a:lstStyle/>
+          <a:p>
+            <a:pPr lvl="0" rtl="0">
+              <a:spcBef>
+                <a:spcPts val="0"/>
+              </a:spcBef>
+              <a:buNone/>
+            </a:pPr>
+            <a:r>
+              <a:rPr lang="en-US" sz="3000" dirty="0">
+                <a:solidFill>
+                  <a:srgbClr val="003366"/>
+                </a:solidFill>
+              </a:rPr>
+              <a:t>Architecture Overview</a:t>
+            </a:r>
+            <a:endParaRPr sz="3000" dirty="0">
+              <a:solidFill>
+                <a:srgbClr val="003366"/>
+              </a:solidFill>
+            </a:endParaRPr>
+          </a:p>
+        </p:txBody>
+      </p:sp>
+      <p:sp>
+        <p:nvSpPr>
+          <p:cNvPr id="52" name="Shape 52"/>
+          <p:cNvSpPr txBox="1">
+            <a:spLocks noGrp="1"/>
+          </p:cNvSpPr>
+          <p:nvPr>
+            <p:ph type="body" idx="1"/>
+          </p:nvPr>
+        </p:nvSpPr>
+        <p:spPr>
+          <a:xfrm>
+            <a:off x="457200" y="766050"/>
+            <a:ext cx="8229600" cy="5325900"/>
+          </a:xfrm>
+          <a:prstGeom prst="rect">
+            <a:avLst/>
+          </a:prstGeom>
+        </p:spPr>
+        <p:txBody>
+          <a:bodyPr lIns="91425" tIns="91425" rIns="91425" bIns="91425" anchor="ctr" anchorCtr="0">
+            <a:noAutofit/>
+          </a:bodyPr>
+          <a:lstStyle/>
+          <a:p>
+            <a:pPr lvl="0" algn="just" rtl="0">
+              <a:spcBef>
+                <a:spcPts val="0"/>
+              </a:spcBef>
+              <a:buNone/>
+            </a:pPr>
+            <a:endParaRPr sz="2200">
+              <a:solidFill>
+                <a:srgbClr val="003366"/>
+              </a:solidFill>
+            </a:endParaRPr>
+          </a:p>
+        </p:txBody>
+      </p:sp>
+      <p:pic>
+        <p:nvPicPr>
+          <p:cNvPr id="53" name="Shape 53"/>
+          <p:cNvPicPr preferRelativeResize="0"/>
+          <p:nvPr/>
+        </p:nvPicPr>
+        <p:blipFill>
+          <a:blip r:embed="rId3">
+            <a:alphaModFix/>
+          </a:blip>
+          <a:stretch>
+            <a:fillRect/>
+          </a:stretch>
+        </p:blipFill>
+        <p:spPr>
+          <a:xfrm>
+            <a:off x="82450" y="65950"/>
+            <a:ext cx="464900" cy="498650"/>
+          </a:xfrm>
+          <a:prstGeom prst="rect">
+            <a:avLst/>
+          </a:prstGeom>
+          <a:noFill/>
+          <a:ln>
+            <a:noFill/>
+          </a:ln>
+        </p:spPr>
+      </p:pic>
+      <p:pic>
+        <p:nvPicPr>
+          <p:cNvPr id="54" name="Shape 54"/>
+          <p:cNvPicPr preferRelativeResize="0"/>
+          <p:nvPr/>
+        </p:nvPicPr>
+        <p:blipFill>
+          <a:blip r:embed="rId4">
+            <a:alphaModFix/>
+          </a:blip>
+          <a:stretch>
+            <a:fillRect/>
+          </a:stretch>
+        </p:blipFill>
+        <p:spPr>
+          <a:xfrm>
+            <a:off x="0" y="630539"/>
+            <a:ext cx="9143998" cy="97471"/>
+          </a:xfrm>
+          <a:prstGeom prst="rect">
+            <a:avLst/>
+          </a:prstGeom>
+          <a:noFill/>
+          <a:ln>
+            <a:noFill/>
+          </a:ln>
+        </p:spPr>
+      </p:pic>
+      <p:cxnSp>
+        <p:nvCxnSpPr>
+          <p:cNvPr id="55" name="Shape 55"/>
+          <p:cNvCxnSpPr/>
+          <p:nvPr/>
+        </p:nvCxnSpPr>
+        <p:spPr>
+          <a:xfrm rot="10800000">
+            <a:off x="691550" y="125"/>
+            <a:ext cx="0" cy="630299"/>
+          </a:xfrm>
+          <a:prstGeom prst="straightConnector1">
+            <a:avLst/>
+          </a:prstGeom>
+          <a:noFill/>
+          <a:ln w="9525" cap="flat">
+            <a:solidFill>
+              <a:srgbClr val="003366"/>
+            </a:solidFill>
+            <a:prstDash val="solid"/>
+            <a:round/>
+            <a:headEnd type="none" w="lg" len="lg"/>
+            <a:tailEnd type="none" w="lg" len="lg"/>
+          </a:ln>
+        </p:spPr>
+      </p:cxnSp>
+      <p:sp>
+        <p:nvSpPr>
+          <p:cNvPr id="56" name="Shape 56"/>
+          <p:cNvSpPr txBox="1"/>
+          <p:nvPr/>
+        </p:nvSpPr>
+        <p:spPr>
+          <a:xfrm>
+            <a:off x="6783700" y="6531000"/>
+            <a:ext cx="2599200" cy="363899"/>
+          </a:xfrm>
+          <a:prstGeom prst="rect">
+            <a:avLst/>
+          </a:prstGeom>
+          <a:noFill/>
+          <a:ln>
+            <a:noFill/>
+          </a:ln>
+        </p:spPr>
+        <p:txBody>
+          <a:bodyPr lIns="91425" tIns="91425" rIns="91425" bIns="91425" anchor="t" anchorCtr="0">
+            <a:noAutofit/>
+          </a:bodyPr>
+          <a:lstStyle/>
+          <a:p>
+            <a:pPr lvl="0" rtl="0">
+              <a:spcBef>
+                <a:spcPts val="0"/>
+              </a:spcBef>
+              <a:buNone/>
+            </a:pPr>
+            <a:r>
+              <a:rPr lang="it" sz="1200" b="1">
+                <a:solidFill>
+                  <a:srgbClr val="FFFFFF"/>
+                </a:solidFill>
+              </a:rPr>
+              <a:t>POLITECNICO DI MILANO</a:t>
+            </a:r>
+          </a:p>
+        </p:txBody>
+      </p:sp>
+      <p:pic>
+        <p:nvPicPr>
+          <p:cNvPr id="57" name="Shape 57"/>
+          <p:cNvPicPr preferRelativeResize="0"/>
+          <p:nvPr/>
+        </p:nvPicPr>
+        <p:blipFill>
+          <a:blip r:embed="rId5">
+            <a:alphaModFix/>
+          </a:blip>
+          <a:stretch>
+            <a:fillRect/>
+          </a:stretch>
+        </p:blipFill>
+        <p:spPr>
+          <a:xfrm>
+            <a:off x="0" y="6571225"/>
+            <a:ext cx="9144000" cy="286775"/>
+          </a:xfrm>
+          <a:prstGeom prst="rect">
+            <a:avLst/>
+          </a:prstGeom>
+          <a:noFill/>
+          <a:ln>
+            <a:noFill/>
+          </a:ln>
+        </p:spPr>
+      </p:pic>
+      <p:sp>
+        <p:nvSpPr>
+          <p:cNvPr id="58" name="Shape 58"/>
+          <p:cNvSpPr txBox="1">
+            <a:spLocks noGrp="1"/>
+          </p:cNvSpPr>
+          <p:nvPr>
+            <p:ph type="ctrTitle" idx="2"/>
+          </p:nvPr>
+        </p:nvSpPr>
+        <p:spPr>
+          <a:xfrm>
+            <a:off x="2196425" y="6531000"/>
+            <a:ext cx="3238799" cy="424199"/>
+          </a:xfrm>
+          <a:prstGeom prst="rect">
+            <a:avLst/>
+          </a:prstGeom>
+        </p:spPr>
+        <p:txBody>
+          <a:bodyPr lIns="91425" tIns="91425" rIns="91425" bIns="91425" anchor="ctr" anchorCtr="0">
+            <a:noAutofit/>
+          </a:bodyPr>
+          <a:lstStyle/>
+          <a:p>
+            <a:pPr lvl="0" indent="457200" rtl="0">
+              <a:lnSpc>
+                <a:spcPct val="115000"/>
+              </a:lnSpc>
+              <a:spcBef>
+                <a:spcPts val="0"/>
+              </a:spcBef>
+              <a:buNone/>
+            </a:pPr>
+            <a:endParaRPr sz="1300">
+              <a:solidFill>
+                <a:srgbClr val="003366"/>
+              </a:solidFill>
+            </a:endParaRPr>
+          </a:p>
+        </p:txBody>
+      </p:sp>
+    </p:spTree>
+    <p:extLst>
+      <p:ext uri="{BB962C8B-B14F-4D97-AF65-F5344CB8AC3E}">
+        <p14:creationId xmlns:p14="http://schemas.microsoft.com/office/powerpoint/2010/main" val="1448003860"/>
+      </p:ext>
+    </p:extLst>
+  </p:cSld>
+  <p:clrMapOvr>
+    <a:masterClrMapping/>
+  </p:clrMapOvr>
+  <p:transition spd="slow">
+    <p:cut/>
+  </p:transition>
+</p:sld>
+</file>
+
+<file path=ppt/slides/slide6.xml><?xml version="1.0" encoding="utf-8"?>
+<p:sld xmlns:a="http://schemas.openxmlformats.org/drawingml/2006/main" xmlns:r="http://schemas.openxmlformats.org/officeDocument/2006/relationships" xmlns:p="http://schemas.openxmlformats.org/presentationml/2006/main">
+  <p:cSld>
+    <p:spTree>
+      <p:nvGrpSpPr>
+        <p:cNvPr id="1" name="Shape 50"/>
+        <p:cNvGrpSpPr/>
+        <p:nvPr/>
+      </p:nvGrpSpPr>
+      <p:grpSpPr>
+        <a:xfrm>
+          <a:off x="0" y="0"/>
+          <a:ext cx="0" cy="0"/>
+          <a:chOff x="0" y="0"/>
+          <a:chExt cx="0" cy="0"/>
+        </a:xfrm>
+      </p:grpSpPr>
+      <p:sp>
+        <p:nvSpPr>
+          <p:cNvPr id="51" name="Shape 51"/>
+          <p:cNvSpPr txBox="1">
+            <a:spLocks noGrp="1"/>
+          </p:cNvSpPr>
+          <p:nvPr>
+            <p:ph type="title"/>
+          </p:nvPr>
+        </p:nvSpPr>
+        <p:spPr>
+          <a:xfrm>
+            <a:off x="837450" y="131950"/>
+            <a:ext cx="8136900" cy="498599"/>
+          </a:xfrm>
+          <a:prstGeom prst="rect">
+            <a:avLst/>
+          </a:prstGeom>
+        </p:spPr>
+        <p:txBody>
+          <a:bodyPr lIns="91425" tIns="91425" rIns="91425" bIns="91425" anchor="b" anchorCtr="0">
+            <a:noAutofit/>
+          </a:bodyPr>
+          <a:lstStyle/>
+          <a:p>
+            <a:pPr lvl="0" rtl="0">
+              <a:spcBef>
+                <a:spcPts val="0"/>
+              </a:spcBef>
+              <a:buNone/>
+            </a:pPr>
+            <a:endParaRPr sz="3000">
+              <a:solidFill>
+                <a:srgbClr val="003366"/>
+              </a:solidFill>
+            </a:endParaRPr>
+          </a:p>
+        </p:txBody>
+      </p:sp>
+      <p:sp>
+        <p:nvSpPr>
+          <p:cNvPr id="52" name="Shape 52"/>
+          <p:cNvSpPr txBox="1">
+            <a:spLocks noGrp="1"/>
+          </p:cNvSpPr>
+          <p:nvPr>
+            <p:ph type="body" idx="1"/>
+          </p:nvPr>
+        </p:nvSpPr>
+        <p:spPr>
+          <a:xfrm>
+            <a:off x="457200" y="766050"/>
+            <a:ext cx="8229600" cy="5325900"/>
+          </a:xfrm>
+          <a:prstGeom prst="rect">
+            <a:avLst/>
+          </a:prstGeom>
+        </p:spPr>
+        <p:txBody>
+          <a:bodyPr lIns="91425" tIns="91425" rIns="91425" bIns="91425" anchor="ctr" anchorCtr="0">
+            <a:noAutofit/>
+          </a:bodyPr>
+          <a:lstStyle/>
+          <a:p>
+            <a:pPr lvl="0" algn="just" rtl="0">
+              <a:spcBef>
+                <a:spcPts val="0"/>
+              </a:spcBef>
+              <a:buNone/>
+            </a:pPr>
+            <a:endParaRPr sz="2200">
+              <a:solidFill>
+                <a:srgbClr val="003366"/>
+              </a:solidFill>
+            </a:endParaRPr>
+          </a:p>
+        </p:txBody>
+      </p:sp>
+      <p:pic>
+        <p:nvPicPr>
+          <p:cNvPr id="53" name="Shape 53"/>
+          <p:cNvPicPr preferRelativeResize="0"/>
+          <p:nvPr/>
+        </p:nvPicPr>
+        <p:blipFill>
+          <a:blip r:embed="rId3">
+            <a:alphaModFix/>
+          </a:blip>
+          <a:stretch>
+            <a:fillRect/>
+          </a:stretch>
+        </p:blipFill>
+        <p:spPr>
+          <a:xfrm>
+            <a:off x="82450" y="65950"/>
+            <a:ext cx="464900" cy="498650"/>
+          </a:xfrm>
+          <a:prstGeom prst="rect">
+            <a:avLst/>
+          </a:prstGeom>
+          <a:noFill/>
+          <a:ln>
+            <a:noFill/>
+          </a:ln>
+        </p:spPr>
+      </p:pic>
+      <p:pic>
+        <p:nvPicPr>
+          <p:cNvPr id="54" name="Shape 54"/>
+          <p:cNvPicPr preferRelativeResize="0"/>
+          <p:nvPr/>
+        </p:nvPicPr>
+        <p:blipFill>
+          <a:blip r:embed="rId4">
+            <a:alphaModFix/>
+          </a:blip>
+          <a:stretch>
+            <a:fillRect/>
+          </a:stretch>
+        </p:blipFill>
+        <p:spPr>
+          <a:xfrm>
+            <a:off x="0" y="630539"/>
+            <a:ext cx="9143998" cy="97471"/>
+          </a:xfrm>
+          <a:prstGeom prst="rect">
+            <a:avLst/>
+          </a:prstGeom>
+          <a:noFill/>
+          <a:ln>
+            <a:noFill/>
+          </a:ln>
+        </p:spPr>
+      </p:pic>
+      <p:cxnSp>
+        <p:nvCxnSpPr>
+          <p:cNvPr id="55" name="Shape 55"/>
+          <p:cNvCxnSpPr/>
+          <p:nvPr/>
+        </p:nvCxnSpPr>
+        <p:spPr>
+          <a:xfrm rot="10800000">
+            <a:off x="691550" y="125"/>
+            <a:ext cx="0" cy="630299"/>
+          </a:xfrm>
+          <a:prstGeom prst="straightConnector1">
+            <a:avLst/>
+          </a:prstGeom>
+          <a:noFill/>
+          <a:ln w="9525" cap="flat">
+            <a:solidFill>
+              <a:srgbClr val="003366"/>
+            </a:solidFill>
+            <a:prstDash val="solid"/>
+            <a:round/>
+            <a:headEnd type="none" w="lg" len="lg"/>
+            <a:tailEnd type="none" w="lg" len="lg"/>
+          </a:ln>
+        </p:spPr>
+      </p:cxnSp>
+      <p:sp>
+        <p:nvSpPr>
+          <p:cNvPr id="56" name="Shape 56"/>
+          <p:cNvSpPr txBox="1"/>
+          <p:nvPr/>
+        </p:nvSpPr>
+        <p:spPr>
+          <a:xfrm>
+            <a:off x="6783700" y="6531000"/>
+            <a:ext cx="2599200" cy="363899"/>
+          </a:xfrm>
+          <a:prstGeom prst="rect">
+            <a:avLst/>
+          </a:prstGeom>
+          <a:noFill/>
+          <a:ln>
+            <a:noFill/>
+          </a:ln>
+        </p:spPr>
+        <p:txBody>
+          <a:bodyPr lIns="91425" tIns="91425" rIns="91425" bIns="91425" anchor="t" anchorCtr="0">
+            <a:noAutofit/>
+          </a:bodyPr>
+          <a:lstStyle/>
+          <a:p>
+            <a:pPr lvl="0" rtl="0">
+              <a:spcBef>
+                <a:spcPts val="0"/>
+              </a:spcBef>
+              <a:buNone/>
+            </a:pPr>
+            <a:r>
+              <a:rPr lang="it" sz="1200" b="1">
+                <a:solidFill>
+                  <a:srgbClr val="FFFFFF"/>
+                </a:solidFill>
+              </a:rPr>
+              <a:t>POLITECNICO DI MILANO</a:t>
+            </a:r>
+          </a:p>
+        </p:txBody>
+      </p:sp>
+      <p:pic>
+        <p:nvPicPr>
+          <p:cNvPr id="57" name="Shape 57"/>
+          <p:cNvPicPr preferRelativeResize="0"/>
+          <p:nvPr/>
+        </p:nvPicPr>
+        <p:blipFill>
+          <a:blip r:embed="rId5">
+            <a:alphaModFix/>
+          </a:blip>
+          <a:stretch>
+            <a:fillRect/>
+          </a:stretch>
+        </p:blipFill>
+        <p:spPr>
+          <a:xfrm>
+            <a:off x="0" y="6571225"/>
+            <a:ext cx="9144000" cy="286775"/>
+          </a:xfrm>
+          <a:prstGeom prst="rect">
+            <a:avLst/>
+          </a:prstGeom>
+          <a:noFill/>
+          <a:ln>
+            <a:noFill/>
+          </a:ln>
+        </p:spPr>
+      </p:pic>
+      <p:sp>
+        <p:nvSpPr>
+          <p:cNvPr id="58" name="Shape 58"/>
+          <p:cNvSpPr txBox="1">
+            <a:spLocks noGrp="1"/>
+          </p:cNvSpPr>
+          <p:nvPr>
+            <p:ph type="ctrTitle" idx="2"/>
+          </p:nvPr>
+        </p:nvSpPr>
+        <p:spPr>
+          <a:xfrm>
+            <a:off x="2196425" y="6531000"/>
+            <a:ext cx="3238799" cy="424199"/>
+          </a:xfrm>
+          <a:prstGeom prst="rect">
+            <a:avLst/>
+          </a:prstGeom>
+        </p:spPr>
+        <p:txBody>
+          <a:bodyPr lIns="91425" tIns="91425" rIns="91425" bIns="91425" anchor="ctr" anchorCtr="0">
+            <a:noAutofit/>
+          </a:bodyPr>
+          <a:lstStyle/>
+          <a:p>
+            <a:pPr lvl="0" indent="457200" rtl="0">
+              <a:lnSpc>
+                <a:spcPct val="115000"/>
+              </a:lnSpc>
+              <a:spcBef>
+                <a:spcPts val="0"/>
+              </a:spcBef>
+              <a:buNone/>
+            </a:pPr>
+            <a:endParaRPr sz="1300">
+              <a:solidFill>
+                <a:srgbClr val="003366"/>
+              </a:solidFill>
+            </a:endParaRPr>
+          </a:p>
+        </p:txBody>
+      </p:sp>
+    </p:spTree>
+    <p:extLst>
+      <p:ext uri="{BB962C8B-B14F-4D97-AF65-F5344CB8AC3E}">
+        <p14:creationId xmlns:p14="http://schemas.microsoft.com/office/powerpoint/2010/main" val="686263328"/>
+      </p:ext>
+    </p:extLst>
+  </p:cSld>
+  <p:clrMapOvr>
+    <a:masterClrMapping/>
+  </p:clrMapOvr>
+  <p:transition spd="slow">
+    <p:cut/>
+  </p:transition>
+</p:sld>
+</file>
+
+<file path=ppt/slides/slide7.xml><?xml version="1.0" encoding="utf-8"?>
+<p:sld xmlns:a="http://schemas.openxmlformats.org/drawingml/2006/main" xmlns:r="http://schemas.openxmlformats.org/officeDocument/2006/relationships" xmlns:p="http://schemas.openxmlformats.org/presentationml/2006/main">
+  <p:cSld>
+    <p:spTree>
+      <p:nvGrpSpPr>
+        <p:cNvPr id="1" name="Shape 50"/>
+        <p:cNvGrpSpPr/>
+        <p:nvPr/>
+      </p:nvGrpSpPr>
+      <p:grpSpPr>
+        <a:xfrm>
+          <a:off x="0" y="0"/>
+          <a:ext cx="0" cy="0"/>
+          <a:chOff x="0" y="0"/>
+          <a:chExt cx="0" cy="0"/>
+        </a:xfrm>
+      </p:grpSpPr>
+      <p:sp>
+        <p:nvSpPr>
+          <p:cNvPr id="51" name="Shape 51"/>
+          <p:cNvSpPr txBox="1">
+            <a:spLocks noGrp="1"/>
+          </p:cNvSpPr>
+          <p:nvPr>
+            <p:ph type="title"/>
+          </p:nvPr>
+        </p:nvSpPr>
+        <p:spPr>
+          <a:xfrm>
+            <a:off x="837450" y="131950"/>
+            <a:ext cx="8136900" cy="498599"/>
+          </a:xfrm>
+          <a:prstGeom prst="rect">
+            <a:avLst/>
+          </a:prstGeom>
+        </p:spPr>
+        <p:txBody>
+          <a:bodyPr lIns="91425" tIns="91425" rIns="91425" bIns="91425" anchor="b" anchorCtr="0">
+            <a:noAutofit/>
+          </a:bodyPr>
+          <a:lstStyle/>
+          <a:p>
+            <a:pPr lvl="0" rtl="0">
+              <a:spcBef>
+                <a:spcPts val="0"/>
+              </a:spcBef>
+              <a:buNone/>
+            </a:pPr>
+            <a:r>
+              <a:rPr lang="en-US" sz="3000" dirty="0">
+                <a:solidFill>
+                  <a:srgbClr val="003366"/>
+                </a:solidFill>
+              </a:rPr>
+              <a:t>Experiment Results</a:t>
+            </a:r>
+            <a:endParaRPr sz="3000" dirty="0">
+              <a:solidFill>
+                <a:srgbClr val="003366"/>
+              </a:solidFill>
+            </a:endParaRPr>
+          </a:p>
+        </p:txBody>
+      </p:sp>
+      <p:sp>
+        <p:nvSpPr>
+          <p:cNvPr id="52" name="Shape 52"/>
+          <p:cNvSpPr txBox="1">
+            <a:spLocks noGrp="1"/>
+          </p:cNvSpPr>
+          <p:nvPr>
+            <p:ph type="body" idx="1"/>
+          </p:nvPr>
+        </p:nvSpPr>
+        <p:spPr>
+          <a:xfrm>
+            <a:off x="457200" y="766050"/>
+            <a:ext cx="8229600" cy="5325900"/>
+          </a:xfrm>
+          <a:prstGeom prst="rect">
+            <a:avLst/>
+          </a:prstGeom>
+        </p:spPr>
+        <p:txBody>
+          <a:bodyPr lIns="91425" tIns="91425" rIns="91425" bIns="91425" anchor="ctr" anchorCtr="0">
+            <a:noAutofit/>
+          </a:bodyPr>
+          <a:lstStyle/>
+          <a:p>
+            <a:pPr lvl="0" algn="just" rtl="0">
+              <a:spcBef>
+                <a:spcPts val="0"/>
+              </a:spcBef>
+              <a:buNone/>
+            </a:pPr>
+            <a:endParaRPr sz="2200">
+              <a:solidFill>
+                <a:srgbClr val="003366"/>
+              </a:solidFill>
+            </a:endParaRPr>
+          </a:p>
+        </p:txBody>
+      </p:sp>
+      <p:pic>
+        <p:nvPicPr>
+          <p:cNvPr id="53" name="Shape 53"/>
+          <p:cNvPicPr preferRelativeResize="0"/>
+          <p:nvPr/>
+        </p:nvPicPr>
+        <p:blipFill>
+          <a:blip r:embed="rId3">
+            <a:alphaModFix/>
+          </a:blip>
+          <a:stretch>
+            <a:fillRect/>
+          </a:stretch>
+        </p:blipFill>
+        <p:spPr>
+          <a:xfrm>
+            <a:off x="82450" y="65950"/>
+            <a:ext cx="464900" cy="498650"/>
+          </a:xfrm>
+          <a:prstGeom prst="rect">
+            <a:avLst/>
+          </a:prstGeom>
+          <a:noFill/>
+          <a:ln>
+            <a:noFill/>
+          </a:ln>
+        </p:spPr>
+      </p:pic>
+      <p:pic>
+        <p:nvPicPr>
+          <p:cNvPr id="54" name="Shape 54"/>
+          <p:cNvPicPr preferRelativeResize="0"/>
+          <p:nvPr/>
+        </p:nvPicPr>
+        <p:blipFill>
+          <a:blip r:embed="rId4">
+            <a:alphaModFix/>
+          </a:blip>
+          <a:stretch>
+            <a:fillRect/>
+          </a:stretch>
+        </p:blipFill>
+        <p:spPr>
+          <a:xfrm>
+            <a:off x="0" y="630539"/>
+            <a:ext cx="9143998" cy="97471"/>
+          </a:xfrm>
+          <a:prstGeom prst="rect">
+            <a:avLst/>
+          </a:prstGeom>
+          <a:noFill/>
+          <a:ln>
+            <a:noFill/>
+          </a:ln>
+        </p:spPr>
+      </p:pic>
+      <p:cxnSp>
+        <p:nvCxnSpPr>
+          <p:cNvPr id="55" name="Shape 55"/>
+          <p:cNvCxnSpPr/>
+          <p:nvPr/>
+        </p:nvCxnSpPr>
+        <p:spPr>
+          <a:xfrm rot="10800000">
+            <a:off x="691550" y="125"/>
+            <a:ext cx="0" cy="630299"/>
+          </a:xfrm>
+          <a:prstGeom prst="straightConnector1">
+            <a:avLst/>
+          </a:prstGeom>
+          <a:noFill/>
+          <a:ln w="9525" cap="flat">
+            <a:solidFill>
+              <a:srgbClr val="003366"/>
+            </a:solidFill>
+            <a:prstDash val="solid"/>
+            <a:round/>
+            <a:headEnd type="none" w="lg" len="lg"/>
+            <a:tailEnd type="none" w="lg" len="lg"/>
+          </a:ln>
+        </p:spPr>
+      </p:cxnSp>
+      <p:sp>
+        <p:nvSpPr>
+          <p:cNvPr id="56" name="Shape 56"/>
+          <p:cNvSpPr txBox="1"/>
+          <p:nvPr/>
+        </p:nvSpPr>
+        <p:spPr>
+          <a:xfrm>
+            <a:off x="6783700" y="6531000"/>
+            <a:ext cx="2599200" cy="363899"/>
+          </a:xfrm>
+          <a:prstGeom prst="rect">
+            <a:avLst/>
+          </a:prstGeom>
+          <a:noFill/>
+          <a:ln>
+            <a:noFill/>
+          </a:ln>
+        </p:spPr>
+        <p:txBody>
+          <a:bodyPr lIns="91425" tIns="91425" rIns="91425" bIns="91425" anchor="t" anchorCtr="0">
+            <a:noAutofit/>
+          </a:bodyPr>
+          <a:lstStyle/>
+          <a:p>
+            <a:pPr lvl="0" rtl="0">
+              <a:spcBef>
+                <a:spcPts val="0"/>
+              </a:spcBef>
+              <a:buNone/>
+            </a:pPr>
+            <a:r>
+              <a:rPr lang="it" sz="1200" b="1">
+                <a:solidFill>
+                  <a:srgbClr val="FFFFFF"/>
+                </a:solidFill>
+              </a:rPr>
+              <a:t>POLITECNICO DI MILANO</a:t>
+            </a:r>
+          </a:p>
+        </p:txBody>
+      </p:sp>
+      <p:pic>
+        <p:nvPicPr>
+          <p:cNvPr id="57" name="Shape 57"/>
+          <p:cNvPicPr preferRelativeResize="0"/>
+          <p:nvPr/>
+        </p:nvPicPr>
+        <p:blipFill>
+          <a:blip r:embed="rId5">
+            <a:alphaModFix/>
+          </a:blip>
+          <a:stretch>
+            <a:fillRect/>
+          </a:stretch>
+        </p:blipFill>
+        <p:spPr>
+          <a:xfrm>
+            <a:off x="0" y="6571225"/>
+            <a:ext cx="9144000" cy="286775"/>
+          </a:xfrm>
+          <a:prstGeom prst="rect">
+            <a:avLst/>
+          </a:prstGeom>
+          <a:noFill/>
+          <a:ln>
+            <a:noFill/>
+          </a:ln>
+        </p:spPr>
+      </p:pic>
+      <p:sp>
+        <p:nvSpPr>
+          <p:cNvPr id="58" name="Shape 58"/>
+          <p:cNvSpPr txBox="1">
+            <a:spLocks noGrp="1"/>
+          </p:cNvSpPr>
+          <p:nvPr>
+            <p:ph type="ctrTitle" idx="2"/>
+          </p:nvPr>
+        </p:nvSpPr>
+        <p:spPr>
+          <a:xfrm>
+            <a:off x="2196425" y="6531000"/>
+            <a:ext cx="3238799" cy="424199"/>
+          </a:xfrm>
+          <a:prstGeom prst="rect">
+            <a:avLst/>
+          </a:prstGeom>
+        </p:spPr>
+        <p:txBody>
+          <a:bodyPr lIns="91425" tIns="91425" rIns="91425" bIns="91425" anchor="ctr" anchorCtr="0">
+            <a:noAutofit/>
+          </a:bodyPr>
+          <a:lstStyle/>
+          <a:p>
+            <a:pPr lvl="0" indent="457200" rtl="0">
+              <a:lnSpc>
+                <a:spcPct val="115000"/>
+              </a:lnSpc>
+              <a:spcBef>
+                <a:spcPts val="0"/>
+              </a:spcBef>
+              <a:buNone/>
+            </a:pPr>
+            <a:endParaRPr sz="1300">
+              <a:solidFill>
+                <a:srgbClr val="003366"/>
+              </a:solidFill>
+            </a:endParaRPr>
+          </a:p>
+        </p:txBody>
+      </p:sp>
+    </p:spTree>
+    <p:extLst>
+      <p:ext uri="{BB962C8B-B14F-4D97-AF65-F5344CB8AC3E}">
+        <p14:creationId xmlns:p14="http://schemas.microsoft.com/office/powerpoint/2010/main" val="498855835"/>
+      </p:ext>
+    </p:extLst>
+  </p:cSld>
+  <p:clrMapOvr>
+    <a:masterClrMapping/>
+  </p:clrMapOvr>
+  <p:transition spd="slow">
+    <p:cut/>
+  </p:transition>
+</p:sld>
+</file>
+
+<file path=ppt/slides/slide8.xml><?xml version="1.0" encoding="utf-8"?>
+<p:sld xmlns:a="http://schemas.openxmlformats.org/drawingml/2006/main" xmlns:r="http://schemas.openxmlformats.org/officeDocument/2006/relationships" xmlns:p="http://schemas.openxmlformats.org/presentationml/2006/main">
+  <p:cSld>
+    <p:spTree>
+      <p:nvGrpSpPr>
+        <p:cNvPr id="1" name="Shape 50"/>
+        <p:cNvGrpSpPr/>
+        <p:nvPr/>
+      </p:nvGrpSpPr>
+      <p:grpSpPr>
+        <a:xfrm>
+          <a:off x="0" y="0"/>
+          <a:ext cx="0" cy="0"/>
+          <a:chOff x="0" y="0"/>
+          <a:chExt cx="0" cy="0"/>
+        </a:xfrm>
+      </p:grpSpPr>
+      <p:sp>
+        <p:nvSpPr>
+          <p:cNvPr id="51" name="Shape 51"/>
+          <p:cNvSpPr txBox="1">
+            <a:spLocks noGrp="1"/>
+          </p:cNvSpPr>
+          <p:nvPr>
+            <p:ph type="title"/>
+          </p:nvPr>
+        </p:nvSpPr>
+        <p:spPr>
+          <a:xfrm>
+            <a:off x="837450" y="131950"/>
+            <a:ext cx="8136900" cy="498599"/>
+          </a:xfrm>
+          <a:prstGeom prst="rect">
+            <a:avLst/>
+          </a:prstGeom>
+        </p:spPr>
+        <p:txBody>
+          <a:bodyPr lIns="91425" tIns="91425" rIns="91425" bIns="91425" anchor="b" anchorCtr="0">
+            <a:noAutofit/>
+          </a:bodyPr>
+          <a:lstStyle/>
+          <a:p>
+            <a:pPr lvl="0" rtl="0">
+              <a:spcBef>
+                <a:spcPts val="0"/>
+              </a:spcBef>
+              <a:buNone/>
+            </a:pPr>
+            <a:endParaRPr sz="3000">
+              <a:solidFill>
+                <a:srgbClr val="003366"/>
+              </a:solidFill>
+            </a:endParaRPr>
+          </a:p>
+        </p:txBody>
+      </p:sp>
+      <p:sp>
+        <p:nvSpPr>
+          <p:cNvPr id="52" name="Shape 52"/>
+          <p:cNvSpPr txBox="1">
+            <a:spLocks noGrp="1"/>
+          </p:cNvSpPr>
+          <p:nvPr>
+            <p:ph type="body" idx="1"/>
+          </p:nvPr>
+        </p:nvSpPr>
+        <p:spPr>
+          <a:xfrm>
+            <a:off x="457200" y="766050"/>
+            <a:ext cx="8229600" cy="5325900"/>
+          </a:xfrm>
+          <a:prstGeom prst="rect">
+            <a:avLst/>
+          </a:prstGeom>
+        </p:spPr>
+        <p:txBody>
+          <a:bodyPr lIns="91425" tIns="91425" rIns="91425" bIns="91425" anchor="ctr" anchorCtr="0">
+            <a:noAutofit/>
+          </a:bodyPr>
+          <a:lstStyle/>
+          <a:p>
+            <a:pPr lvl="0" algn="just" rtl="0">
+              <a:spcBef>
+                <a:spcPts val="0"/>
+              </a:spcBef>
+              <a:buNone/>
+            </a:pPr>
+            <a:endParaRPr sz="2200">
+              <a:solidFill>
+                <a:srgbClr val="003366"/>
+              </a:solidFill>
+            </a:endParaRPr>
+          </a:p>
+        </p:txBody>
+      </p:sp>
+      <p:pic>
+        <p:nvPicPr>
+          <p:cNvPr id="53" name="Shape 53"/>
+          <p:cNvPicPr preferRelativeResize="0"/>
+          <p:nvPr/>
+        </p:nvPicPr>
+        <p:blipFill>
+          <a:blip r:embed="rId3">
+            <a:alphaModFix/>
+          </a:blip>
+          <a:stretch>
+            <a:fillRect/>
+          </a:stretch>
+        </p:blipFill>
+        <p:spPr>
+          <a:xfrm>
+            <a:off x="82450" y="65950"/>
+            <a:ext cx="464900" cy="498650"/>
+          </a:xfrm>
+          <a:prstGeom prst="rect">
+            <a:avLst/>
+          </a:prstGeom>
+          <a:noFill/>
+          <a:ln>
+            <a:noFill/>
+          </a:ln>
+        </p:spPr>
+      </p:pic>
+      <p:pic>
+        <p:nvPicPr>
+          <p:cNvPr id="54" name="Shape 54"/>
+          <p:cNvPicPr preferRelativeResize="0"/>
+          <p:nvPr/>
+        </p:nvPicPr>
+        <p:blipFill>
+          <a:blip r:embed="rId4">
+            <a:alphaModFix/>
+          </a:blip>
+          <a:stretch>
+            <a:fillRect/>
+          </a:stretch>
+        </p:blipFill>
+        <p:spPr>
+          <a:xfrm>
+            <a:off x="0" y="630539"/>
+            <a:ext cx="9143998" cy="97471"/>
+          </a:xfrm>
+          <a:prstGeom prst="rect">
+            <a:avLst/>
+          </a:prstGeom>
+          <a:noFill/>
+          <a:ln>
+            <a:noFill/>
+          </a:ln>
+        </p:spPr>
+      </p:pic>
+      <p:cxnSp>
+        <p:nvCxnSpPr>
+          <p:cNvPr id="55" name="Shape 55"/>
+          <p:cNvCxnSpPr/>
+          <p:nvPr/>
+        </p:nvCxnSpPr>
+        <p:spPr>
+          <a:xfrm rot="10800000">
+            <a:off x="691550" y="125"/>
+            <a:ext cx="0" cy="630299"/>
+          </a:xfrm>
+          <a:prstGeom prst="straightConnector1">
+            <a:avLst/>
+          </a:prstGeom>
+          <a:noFill/>
+          <a:ln w="9525" cap="flat">
+            <a:solidFill>
+              <a:srgbClr val="003366"/>
+            </a:solidFill>
+            <a:prstDash val="solid"/>
+            <a:round/>
+            <a:headEnd type="none" w="lg" len="lg"/>
+            <a:tailEnd type="none" w="lg" len="lg"/>
+          </a:ln>
+        </p:spPr>
+      </p:cxnSp>
+      <p:sp>
+        <p:nvSpPr>
+          <p:cNvPr id="56" name="Shape 56"/>
+          <p:cNvSpPr txBox="1"/>
+          <p:nvPr/>
+        </p:nvSpPr>
+        <p:spPr>
+          <a:xfrm>
+            <a:off x="6783700" y="6531000"/>
+            <a:ext cx="2599200" cy="363899"/>
+          </a:xfrm>
+          <a:prstGeom prst="rect">
+            <a:avLst/>
+          </a:prstGeom>
+          <a:noFill/>
+          <a:ln>
+            <a:noFill/>
+          </a:ln>
+        </p:spPr>
+        <p:txBody>
+          <a:bodyPr lIns="91425" tIns="91425" rIns="91425" bIns="91425" anchor="t" anchorCtr="0">
+            <a:noAutofit/>
+          </a:bodyPr>
+          <a:lstStyle/>
+          <a:p>
+            <a:pPr lvl="0" rtl="0">
+              <a:spcBef>
+                <a:spcPts val="0"/>
+              </a:spcBef>
+              <a:buNone/>
+            </a:pPr>
+            <a:r>
+              <a:rPr lang="it" sz="1200" b="1">
+                <a:solidFill>
+                  <a:srgbClr val="FFFFFF"/>
+                </a:solidFill>
+              </a:rPr>
+              <a:t>POLITECNICO DI MILANO</a:t>
+            </a:r>
+          </a:p>
+        </p:txBody>
+      </p:sp>
+      <p:pic>
+        <p:nvPicPr>
+          <p:cNvPr id="57" name="Shape 57"/>
+          <p:cNvPicPr preferRelativeResize="0"/>
+          <p:nvPr/>
+        </p:nvPicPr>
+        <p:blipFill>
+          <a:blip r:embed="rId5">
+            <a:alphaModFix/>
+          </a:blip>
+          <a:stretch>
+            <a:fillRect/>
+          </a:stretch>
+        </p:blipFill>
+        <p:spPr>
+          <a:xfrm>
+            <a:off x="0" y="6571225"/>
+            <a:ext cx="9144000" cy="286775"/>
+          </a:xfrm>
+          <a:prstGeom prst="rect">
+            <a:avLst/>
+          </a:prstGeom>
+          <a:noFill/>
+          <a:ln>
+            <a:noFill/>
+          </a:ln>
+        </p:spPr>
+      </p:pic>
+      <p:sp>
+        <p:nvSpPr>
+          <p:cNvPr id="58" name="Shape 58"/>
+          <p:cNvSpPr txBox="1">
+            <a:spLocks noGrp="1"/>
+          </p:cNvSpPr>
+          <p:nvPr>
+            <p:ph type="ctrTitle" idx="2"/>
+          </p:nvPr>
+        </p:nvSpPr>
+        <p:spPr>
+          <a:xfrm>
+            <a:off x="2196425" y="6531000"/>
+            <a:ext cx="3238799" cy="424199"/>
+          </a:xfrm>
+          <a:prstGeom prst="rect">
+            <a:avLst/>
+          </a:prstGeom>
+        </p:spPr>
+        <p:txBody>
+          <a:bodyPr lIns="91425" tIns="91425" rIns="91425" bIns="91425" anchor="ctr" anchorCtr="0">
+            <a:noAutofit/>
+          </a:bodyPr>
+          <a:lstStyle/>
+          <a:p>
+            <a:pPr lvl="0" indent="457200" rtl="0">
+              <a:lnSpc>
+                <a:spcPct val="115000"/>
+              </a:lnSpc>
+              <a:spcBef>
+                <a:spcPts val="0"/>
+              </a:spcBef>
+              <a:buNone/>
+            </a:pPr>
+            <a:endParaRPr sz="1300">
+              <a:solidFill>
+                <a:srgbClr val="003366"/>
+              </a:solidFill>
+            </a:endParaRPr>
+          </a:p>
+        </p:txBody>
+      </p:sp>
+    </p:spTree>
+    <p:extLst>
+      <p:ext uri="{BB962C8B-B14F-4D97-AF65-F5344CB8AC3E}">
+        <p14:creationId xmlns:p14="http://schemas.microsoft.com/office/powerpoint/2010/main" val="3060616010"/>
+      </p:ext>
+    </p:extLst>
   </p:cSld>
   <p:clrMapOvr>
     <a:masterClrMapping/>

</xml_diff>